<commit_message>
Update PowerPoint on Joins
</commit_message>
<xml_diff>
--- a/SQL/Visualizing IQSchool SELECT Statements.pptx
+++ b/SQL/Visualizing IQSchool SELECT Statements.pptx
@@ -5,7 +5,7 @@
     <p:sldMasterId id="2147483648" r:id="rId1"/>
   </p:sldMasterIdLst>
   <p:notesMasterIdLst>
-    <p:notesMasterId r:id="rId30"/>
+    <p:notesMasterId r:id="rId32"/>
   </p:notesMasterIdLst>
   <p:sldIdLst>
     <p:sldId id="273" r:id="rId2"/>
@@ -20,22 +20,24 @@
     <p:sldId id="271" r:id="rId11"/>
     <p:sldId id="275" r:id="rId12"/>
     <p:sldId id="278" r:id="rId13"/>
-    <p:sldId id="279" r:id="rId14"/>
-    <p:sldId id="280" r:id="rId15"/>
-    <p:sldId id="287" r:id="rId16"/>
-    <p:sldId id="282" r:id="rId17"/>
-    <p:sldId id="283" r:id="rId18"/>
-    <p:sldId id="284" r:id="rId19"/>
-    <p:sldId id="286" r:id="rId20"/>
-    <p:sldId id="285" r:id="rId21"/>
-    <p:sldId id="281" r:id="rId22"/>
-    <p:sldId id="256" r:id="rId23"/>
-    <p:sldId id="257" r:id="rId24"/>
-    <p:sldId id="258" r:id="rId25"/>
-    <p:sldId id="259" r:id="rId26"/>
-    <p:sldId id="260" r:id="rId27"/>
-    <p:sldId id="261" r:id="rId28"/>
-    <p:sldId id="262" r:id="rId29"/>
+    <p:sldId id="288" r:id="rId14"/>
+    <p:sldId id="279" r:id="rId15"/>
+    <p:sldId id="280" r:id="rId16"/>
+    <p:sldId id="287" r:id="rId17"/>
+    <p:sldId id="289" r:id="rId18"/>
+    <p:sldId id="282" r:id="rId19"/>
+    <p:sldId id="283" r:id="rId20"/>
+    <p:sldId id="284" r:id="rId21"/>
+    <p:sldId id="286" r:id="rId22"/>
+    <p:sldId id="285" r:id="rId23"/>
+    <p:sldId id="281" r:id="rId24"/>
+    <p:sldId id="256" r:id="rId25"/>
+    <p:sldId id="257" r:id="rId26"/>
+    <p:sldId id="258" r:id="rId27"/>
+    <p:sldId id="259" r:id="rId28"/>
+    <p:sldId id="260" r:id="rId29"/>
+    <p:sldId id="261" r:id="rId30"/>
+    <p:sldId id="262" r:id="rId31"/>
   </p:sldIdLst>
   <p:sldSz cx="9144000" cy="6858000" type="screen4x3"/>
   <p:notesSz cx="6858000" cy="9144000"/>
@@ -235,7 +237,7 @@
           <a:p>
             <a:fld id="{9E079671-F515-4E8E-8BA0-8550DB51D5E5}" type="datetimeFigureOut">
               <a:rPr lang="en-US" smtClean="0"/>
-              <a:t>10/28/2020</a:t>
+              <a:t>10/27/2022</a:t>
             </a:fld>
             <a:endParaRPr lang="en-US"/>
           </a:p>
@@ -2949,7 +2951,7 @@
           <a:p>
             <a:fld id="{B98843B5-F441-42E2-BDBE-849C57E484F6}" type="slidenum">
               <a:rPr lang="en-US" smtClean="0"/>
-              <a:t>17</a:t>
+              <a:t>19</a:t>
             </a:fld>
             <a:endParaRPr lang="en-US"/>
           </a:p>
@@ -3694,7 +3696,7 @@
           <a:p>
             <a:fld id="{B98843B5-F441-42E2-BDBE-849C57E484F6}" type="slidenum">
               <a:rPr lang="en-US" smtClean="0"/>
-              <a:t>23</a:t>
+              <a:t>25</a:t>
             </a:fld>
             <a:endParaRPr lang="en-US"/>
           </a:p>
@@ -4439,7 +4441,7 @@
           <a:p>
             <a:fld id="{B98843B5-F441-42E2-BDBE-849C57E484F6}" type="slidenum">
               <a:rPr lang="en-US" smtClean="0"/>
-              <a:t>24</a:t>
+              <a:t>26</a:t>
             </a:fld>
             <a:endParaRPr lang="en-US"/>
           </a:p>
@@ -5184,7 +5186,7 @@
           <a:p>
             <a:fld id="{B98843B5-F441-42E2-BDBE-849C57E484F6}" type="slidenum">
               <a:rPr lang="en-US" smtClean="0"/>
-              <a:t>25</a:t>
+              <a:t>27</a:t>
             </a:fld>
             <a:endParaRPr lang="en-US"/>
           </a:p>
@@ -5382,7 +5384,7 @@
           <a:p>
             <a:fld id="{628E2357-F43F-4092-906A-DA3B6CA959C5}" type="datetimeFigureOut">
               <a:rPr lang="en-US" smtClean="0"/>
-              <a:t>10/28/2020</a:t>
+              <a:t>10/27/2022</a:t>
             </a:fld>
             <a:endParaRPr lang="en-US"/>
           </a:p>
@@ -5550,7 +5552,7 @@
           <a:p>
             <a:fld id="{628E2357-F43F-4092-906A-DA3B6CA959C5}" type="datetimeFigureOut">
               <a:rPr lang="en-US" smtClean="0"/>
-              <a:t>10/28/2020</a:t>
+              <a:t>10/27/2022</a:t>
             </a:fld>
             <a:endParaRPr lang="en-US"/>
           </a:p>
@@ -5728,7 +5730,7 @@
           <a:p>
             <a:fld id="{628E2357-F43F-4092-906A-DA3B6CA959C5}" type="datetimeFigureOut">
               <a:rPr lang="en-US" smtClean="0"/>
-              <a:t>10/28/2020</a:t>
+              <a:t>10/27/2022</a:t>
             </a:fld>
             <a:endParaRPr lang="en-US"/>
           </a:p>
@@ -5896,7 +5898,7 @@
           <a:p>
             <a:fld id="{628E2357-F43F-4092-906A-DA3B6CA959C5}" type="datetimeFigureOut">
               <a:rPr lang="en-US" smtClean="0"/>
-              <a:t>10/28/2020</a:t>
+              <a:t>10/27/2022</a:t>
             </a:fld>
             <a:endParaRPr lang="en-US"/>
           </a:p>
@@ -6141,7 +6143,7 @@
           <a:p>
             <a:fld id="{628E2357-F43F-4092-906A-DA3B6CA959C5}" type="datetimeFigureOut">
               <a:rPr lang="en-US" smtClean="0"/>
-              <a:t>10/28/2020</a:t>
+              <a:t>10/27/2022</a:t>
             </a:fld>
             <a:endParaRPr lang="en-US"/>
           </a:p>
@@ -6426,7 +6428,7 @@
           <a:p>
             <a:fld id="{628E2357-F43F-4092-906A-DA3B6CA959C5}" type="datetimeFigureOut">
               <a:rPr lang="en-US" smtClean="0"/>
-              <a:t>10/28/2020</a:t>
+              <a:t>10/27/2022</a:t>
             </a:fld>
             <a:endParaRPr lang="en-US"/>
           </a:p>
@@ -6845,7 +6847,7 @@
           <a:p>
             <a:fld id="{628E2357-F43F-4092-906A-DA3B6CA959C5}" type="datetimeFigureOut">
               <a:rPr lang="en-US" smtClean="0"/>
-              <a:t>10/28/2020</a:t>
+              <a:t>10/27/2022</a:t>
             </a:fld>
             <a:endParaRPr lang="en-US"/>
           </a:p>
@@ -6962,7 +6964,7 @@
           <a:p>
             <a:fld id="{628E2357-F43F-4092-906A-DA3B6CA959C5}" type="datetimeFigureOut">
               <a:rPr lang="en-US" smtClean="0"/>
-              <a:t>10/28/2020</a:t>
+              <a:t>10/27/2022</a:t>
             </a:fld>
             <a:endParaRPr lang="en-US"/>
           </a:p>
@@ -7057,7 +7059,7 @@
           <a:p>
             <a:fld id="{628E2357-F43F-4092-906A-DA3B6CA959C5}" type="datetimeFigureOut">
               <a:rPr lang="en-US" smtClean="0"/>
-              <a:t>10/28/2020</a:t>
+              <a:t>10/27/2022</a:t>
             </a:fld>
             <a:endParaRPr lang="en-US"/>
           </a:p>
@@ -7332,7 +7334,7 @@
           <a:p>
             <a:fld id="{628E2357-F43F-4092-906A-DA3B6CA959C5}" type="datetimeFigureOut">
               <a:rPr lang="en-US" smtClean="0"/>
-              <a:t>10/28/2020</a:t>
+              <a:t>10/27/2022</a:t>
             </a:fld>
             <a:endParaRPr lang="en-US"/>
           </a:p>
@@ -7584,7 +7586,7 @@
           <a:p>
             <a:fld id="{628E2357-F43F-4092-906A-DA3B6CA959C5}" type="datetimeFigureOut">
               <a:rPr lang="en-US" smtClean="0"/>
-              <a:t>10/28/2020</a:t>
+              <a:t>10/27/2022</a:t>
             </a:fld>
             <a:endParaRPr lang="en-US"/>
           </a:p>
@@ -7795,7 +7797,7 @@
           <a:p>
             <a:fld id="{628E2357-F43F-4092-906A-DA3B6CA959C5}" type="datetimeFigureOut">
               <a:rPr lang="en-US" smtClean="0"/>
-              <a:t>10/28/2020</a:t>
+              <a:t>10/27/2022</a:t>
             </a:fld>
             <a:endParaRPr lang="en-US"/>
           </a:p>
@@ -9406,6 +9408,1167 @@
           <a:p>
             <a:r>
               <a:rPr lang="en-US" dirty="0"/>
+              <a:t>Select the club name and student id for all clubs that students are registered in.</a:t>
+            </a:r>
+          </a:p>
+        </p:txBody>
+      </p:sp>
+      <p:sp>
+        <p:nvSpPr>
+          <p:cNvPr id="3" name="TextBox 2"/>
+          <p:cNvSpPr txBox="1"/>
+          <p:nvPr/>
+        </p:nvSpPr>
+        <p:spPr>
+          <a:xfrm>
+            <a:off x="609600" y="522982"/>
+            <a:ext cx="7696200" cy="1077218"/>
+          </a:xfrm>
+          <a:prstGeom prst="rect">
+            <a:avLst/>
+          </a:prstGeom>
+          <a:noFill/>
+        </p:spPr>
+        <p:txBody>
+          <a:bodyPr wrap="square" rtlCol="0">
+            <a:spAutoFit/>
+          </a:bodyPr>
+          <a:lstStyle/>
+          <a:p>
+            <a:r>
+              <a:rPr lang="en-US" sz="1600" dirty="0">
+                <a:solidFill>
+                  <a:srgbClr val="0070C0"/>
+                </a:solidFill>
+                <a:latin typeface="Courier New" panose="02070309020205020404" pitchFamily="49" charset="0"/>
+                <a:cs typeface="Courier New" panose="02070309020205020404" pitchFamily="49" charset="0"/>
+              </a:rPr>
+              <a:t>SELECT</a:t>
+            </a:r>
+            <a:r>
+              <a:rPr lang="en-US" sz="1600" dirty="0">
+                <a:latin typeface="Courier New" panose="02070309020205020404" pitchFamily="49" charset="0"/>
+                <a:cs typeface="Courier New" panose="02070309020205020404" pitchFamily="49" charset="0"/>
+              </a:rPr>
+              <a:t>  </a:t>
+            </a:r>
+            <a:r>
+              <a:rPr lang="en-US" sz="1600" dirty="0" err="1">
+                <a:latin typeface="Courier New" panose="02070309020205020404" pitchFamily="49" charset="0"/>
+                <a:cs typeface="Courier New" panose="02070309020205020404" pitchFamily="49" charset="0"/>
+              </a:rPr>
+              <a:t>C.ClubId</a:t>
+            </a:r>
+            <a:r>
+              <a:rPr lang="en-US" sz="1600" dirty="0">
+                <a:latin typeface="Courier New" panose="02070309020205020404" pitchFamily="49" charset="0"/>
+                <a:cs typeface="Courier New" panose="02070309020205020404" pitchFamily="49" charset="0"/>
+              </a:rPr>
+              <a:t>, </a:t>
+            </a:r>
+            <a:r>
+              <a:rPr lang="en-US" sz="1600" dirty="0" err="1">
+                <a:latin typeface="Courier New" panose="02070309020205020404" pitchFamily="49" charset="0"/>
+                <a:cs typeface="Courier New" panose="02070309020205020404" pitchFamily="49" charset="0"/>
+              </a:rPr>
+              <a:t>ClubName</a:t>
+            </a:r>
+            <a:r>
+              <a:rPr lang="en-US" sz="1600" dirty="0">
+                <a:latin typeface="Courier New" panose="02070309020205020404" pitchFamily="49" charset="0"/>
+                <a:cs typeface="Courier New" panose="02070309020205020404" pitchFamily="49" charset="0"/>
+              </a:rPr>
+              <a:t>, </a:t>
+            </a:r>
+            <a:r>
+              <a:rPr lang="en-US" sz="1600" dirty="0" err="1">
+                <a:latin typeface="Courier New" panose="02070309020205020404" pitchFamily="49" charset="0"/>
+                <a:cs typeface="Courier New" panose="02070309020205020404" pitchFamily="49" charset="0"/>
+              </a:rPr>
+              <a:t>StudentID</a:t>
+            </a:r>
+            <a:r>
+              <a:rPr lang="en-US" sz="1600" dirty="0">
+                <a:latin typeface="Courier New" panose="02070309020205020404" pitchFamily="49" charset="0"/>
+                <a:cs typeface="Courier New" panose="02070309020205020404" pitchFamily="49" charset="0"/>
+              </a:rPr>
+              <a:t>, </a:t>
+            </a:r>
+            <a:r>
+              <a:rPr lang="en-US" sz="1600" dirty="0" err="1">
+                <a:latin typeface="Courier New" panose="02070309020205020404" pitchFamily="49" charset="0"/>
+                <a:cs typeface="Courier New" panose="02070309020205020404" pitchFamily="49" charset="0"/>
+              </a:rPr>
+              <a:t>A.ClubId</a:t>
+            </a:r>
+            <a:endParaRPr lang="en-US" sz="1600" dirty="0">
+              <a:latin typeface="Courier New" panose="02070309020205020404" pitchFamily="49" charset="0"/>
+              <a:cs typeface="Courier New" panose="02070309020205020404" pitchFamily="49" charset="0"/>
+            </a:endParaRPr>
+          </a:p>
+          <a:p>
+            <a:r>
+              <a:rPr lang="en-US" sz="1600" dirty="0">
+                <a:solidFill>
+                  <a:srgbClr val="0070C0"/>
+                </a:solidFill>
+                <a:latin typeface="Courier New" panose="02070309020205020404" pitchFamily="49" charset="0"/>
+                <a:cs typeface="Courier New" panose="02070309020205020404" pitchFamily="49" charset="0"/>
+              </a:rPr>
+              <a:t>FROM</a:t>
+            </a:r>
+            <a:r>
+              <a:rPr lang="en-US" sz="1600" dirty="0">
+                <a:latin typeface="Courier New" panose="02070309020205020404" pitchFamily="49" charset="0"/>
+                <a:cs typeface="Courier New" panose="02070309020205020404" pitchFamily="49" charset="0"/>
+              </a:rPr>
+              <a:t>    Club C</a:t>
+            </a:r>
+          </a:p>
+          <a:p>
+            <a:r>
+              <a:rPr lang="en-US" sz="1600" dirty="0">
+                <a:latin typeface="Courier New" panose="02070309020205020404" pitchFamily="49" charset="0"/>
+                <a:cs typeface="Courier New" panose="02070309020205020404" pitchFamily="49" charset="0"/>
+              </a:rPr>
+              <a:t>    </a:t>
+            </a:r>
+            <a:r>
+              <a:rPr lang="en-US" sz="1600" dirty="0">
+                <a:solidFill>
+                  <a:srgbClr val="0070C0"/>
+                </a:solidFill>
+                <a:latin typeface="Courier New" panose="02070309020205020404" pitchFamily="49" charset="0"/>
+                <a:cs typeface="Courier New" panose="02070309020205020404" pitchFamily="49" charset="0"/>
+              </a:rPr>
+              <a:t>INNER JOIN </a:t>
+            </a:r>
+            <a:r>
+              <a:rPr lang="en-US" sz="1600" dirty="0">
+                <a:latin typeface="Courier New" panose="02070309020205020404" pitchFamily="49" charset="0"/>
+                <a:cs typeface="Courier New" panose="02070309020205020404" pitchFamily="49" charset="0"/>
+              </a:rPr>
+              <a:t>Activity A</a:t>
+            </a:r>
+          </a:p>
+          <a:p>
+            <a:r>
+              <a:rPr lang="en-US" sz="1600" dirty="0">
+                <a:latin typeface="Courier New" panose="02070309020205020404" pitchFamily="49" charset="0"/>
+                <a:cs typeface="Courier New" panose="02070309020205020404" pitchFamily="49" charset="0"/>
+              </a:rPr>
+              <a:t>            </a:t>
+            </a:r>
+            <a:r>
+              <a:rPr lang="en-US" sz="1600" dirty="0">
+                <a:solidFill>
+                  <a:srgbClr val="0070C0"/>
+                </a:solidFill>
+                <a:latin typeface="Courier New" panose="02070309020205020404" pitchFamily="49" charset="0"/>
+                <a:cs typeface="Courier New" panose="02070309020205020404" pitchFamily="49" charset="0"/>
+              </a:rPr>
+              <a:t>ON</a:t>
+            </a:r>
+            <a:r>
+              <a:rPr lang="en-US" sz="1600" dirty="0">
+                <a:latin typeface="Courier New" panose="02070309020205020404" pitchFamily="49" charset="0"/>
+                <a:cs typeface="Courier New" panose="02070309020205020404" pitchFamily="49" charset="0"/>
+              </a:rPr>
+              <a:t> </a:t>
+            </a:r>
+            <a:r>
+              <a:rPr lang="en-US" sz="1600" dirty="0" err="1">
+                <a:latin typeface="Courier New" panose="02070309020205020404" pitchFamily="49" charset="0"/>
+                <a:cs typeface="Courier New" panose="02070309020205020404" pitchFamily="49" charset="0"/>
+              </a:rPr>
+              <a:t>C.ClubId</a:t>
+            </a:r>
+            <a:r>
+              <a:rPr lang="en-US" sz="1600" dirty="0">
+                <a:latin typeface="Courier New" panose="02070309020205020404" pitchFamily="49" charset="0"/>
+                <a:cs typeface="Courier New" panose="02070309020205020404" pitchFamily="49" charset="0"/>
+              </a:rPr>
+              <a:t> = </a:t>
+            </a:r>
+            <a:r>
+              <a:rPr lang="en-US" sz="1600" dirty="0" err="1">
+                <a:latin typeface="Courier New" panose="02070309020205020404" pitchFamily="49" charset="0"/>
+                <a:cs typeface="Courier New" panose="02070309020205020404" pitchFamily="49" charset="0"/>
+              </a:rPr>
+              <a:t>A.ClubId</a:t>
+            </a:r>
+            <a:endParaRPr lang="en-US" sz="1600" dirty="0">
+              <a:latin typeface="Courier New" panose="02070309020205020404" pitchFamily="49" charset="0"/>
+              <a:cs typeface="Courier New" panose="02070309020205020404" pitchFamily="49" charset="0"/>
+            </a:endParaRPr>
+          </a:p>
+        </p:txBody>
+      </p:sp>
+      <p:graphicFrame>
+        <p:nvGraphicFramePr>
+          <p:cNvPr id="4" name="Table 3"/>
+          <p:cNvGraphicFramePr>
+            <a:graphicFrameLocks noGrp="1"/>
+          </p:cNvGraphicFramePr>
+          <p:nvPr/>
+        </p:nvGraphicFramePr>
+        <p:xfrm>
+          <a:off x="685800" y="1510843"/>
+          <a:ext cx="4800600" cy="3337560"/>
+        </p:xfrm>
+        <a:graphic>
+          <a:graphicData uri="http://schemas.openxmlformats.org/drawingml/2006/table">
+            <a:tbl>
+              <a:tblPr firstRow="1" bandRow="1">
+                <a:tableStyleId>{5C22544A-7EE6-4342-B048-85BDC9FD1C3A}</a:tableStyleId>
+              </a:tblPr>
+              <a:tblGrid>
+                <a:gridCol w="1066800">
+                  <a:extLst>
+                    <a:ext uri="{9D8B030D-6E8A-4147-A177-3AD203B41FA5}">
+                      <a16:colId xmlns:a16="http://schemas.microsoft.com/office/drawing/2014/main" val="20000"/>
+                    </a:ext>
+                  </a:extLst>
+                </a:gridCol>
+                <a:gridCol w="3733800">
+                  <a:extLst>
+                    <a:ext uri="{9D8B030D-6E8A-4147-A177-3AD203B41FA5}">
+                      <a16:colId xmlns:a16="http://schemas.microsoft.com/office/drawing/2014/main" val="20001"/>
+                    </a:ext>
+                  </a:extLst>
+                </a:gridCol>
+              </a:tblGrid>
+              <a:tr h="370840">
+                <a:tc>
+                  <a:txBody>
+                    <a:bodyPr/>
+                    <a:lstStyle/>
+                    <a:p>
+                      <a:r>
+                        <a:rPr lang="en-US" dirty="0" err="1"/>
+                        <a:t>ClubId</a:t>
+                      </a:r>
+                      <a:endParaRPr lang="en-US" dirty="0"/>
+                    </a:p>
+                  </a:txBody>
+                  <a:tcPr/>
+                </a:tc>
+                <a:tc>
+                  <a:txBody>
+                    <a:bodyPr/>
+                    <a:lstStyle/>
+                    <a:p>
+                      <a:r>
+                        <a:rPr lang="en-US" dirty="0" err="1"/>
+                        <a:t>ClubName</a:t>
+                      </a:r>
+                      <a:endParaRPr lang="en-US" dirty="0"/>
+                    </a:p>
+                  </a:txBody>
+                  <a:tcPr/>
+                </a:tc>
+                <a:extLst>
+                  <a:ext uri="{0D108BD9-81ED-4DB2-BD59-A6C34878D82A}">
+                    <a16:rowId xmlns:a16="http://schemas.microsoft.com/office/drawing/2014/main" val="10000"/>
+                  </a:ext>
+                </a:extLst>
+              </a:tr>
+              <a:tr h="370840">
+                <a:tc>
+                  <a:txBody>
+                    <a:bodyPr/>
+                    <a:lstStyle/>
+                    <a:p>
+                      <a:r>
+                        <a:rPr lang="en-US" dirty="0"/>
+                        <a:t>ACM</a:t>
+                      </a:r>
+                    </a:p>
+                  </a:txBody>
+                  <a:tcPr/>
+                </a:tc>
+                <a:tc>
+                  <a:txBody>
+                    <a:bodyPr/>
+                    <a:lstStyle/>
+                    <a:p>
+                      <a:r>
+                        <a:rPr lang="en-US" dirty="0"/>
+                        <a:t>Association of Computing Machinery</a:t>
+                      </a:r>
+                    </a:p>
+                  </a:txBody>
+                  <a:tcPr/>
+                </a:tc>
+                <a:extLst>
+                  <a:ext uri="{0D108BD9-81ED-4DB2-BD59-A6C34878D82A}">
+                    <a16:rowId xmlns:a16="http://schemas.microsoft.com/office/drawing/2014/main" val="10001"/>
+                  </a:ext>
+                </a:extLst>
+              </a:tr>
+              <a:tr h="370840">
+                <a:tc>
+                  <a:txBody>
+                    <a:bodyPr/>
+                    <a:lstStyle/>
+                    <a:p>
+                      <a:r>
+                        <a:rPr lang="en-US" dirty="0"/>
+                        <a:t>CHESS</a:t>
+                      </a:r>
+                    </a:p>
+                  </a:txBody>
+                  <a:tcPr/>
+                </a:tc>
+                <a:tc>
+                  <a:txBody>
+                    <a:bodyPr/>
+                    <a:lstStyle/>
+                    <a:p>
+                      <a:r>
+                        <a:rPr lang="en-US" dirty="0"/>
+                        <a:t>NAIT Chess Club</a:t>
+                      </a:r>
+                    </a:p>
+                  </a:txBody>
+                  <a:tcPr/>
+                </a:tc>
+                <a:extLst>
+                  <a:ext uri="{0D108BD9-81ED-4DB2-BD59-A6C34878D82A}">
+                    <a16:rowId xmlns:a16="http://schemas.microsoft.com/office/drawing/2014/main" val="10002"/>
+                  </a:ext>
+                </a:extLst>
+              </a:tr>
+              <a:tr h="370840">
+                <a:tc>
+                  <a:txBody>
+                    <a:bodyPr/>
+                    <a:lstStyle/>
+                    <a:p>
+                      <a:r>
+                        <a:rPr lang="en-US" strike="sngStrike" dirty="0">
+                          <a:solidFill>
+                            <a:schemeClr val="bg1">
+                              <a:lumMod val="65000"/>
+                            </a:schemeClr>
+                          </a:solidFill>
+                        </a:rPr>
+                        <a:t>CIPS</a:t>
+                      </a:r>
+                    </a:p>
+                  </a:txBody>
+                  <a:tcPr/>
+                </a:tc>
+                <a:tc>
+                  <a:txBody>
+                    <a:bodyPr/>
+                    <a:lstStyle/>
+                    <a:p>
+                      <a:r>
+                        <a:rPr lang="en-US" strike="sngStrike" dirty="0">
+                          <a:solidFill>
+                            <a:schemeClr val="bg1">
+                              <a:lumMod val="65000"/>
+                            </a:schemeClr>
+                          </a:solidFill>
+                        </a:rPr>
+                        <a:t>Computer Info Processing Society</a:t>
+                      </a:r>
+                    </a:p>
+                  </a:txBody>
+                  <a:tcPr/>
+                </a:tc>
+                <a:extLst>
+                  <a:ext uri="{0D108BD9-81ED-4DB2-BD59-A6C34878D82A}">
+                    <a16:rowId xmlns:a16="http://schemas.microsoft.com/office/drawing/2014/main" val="10003"/>
+                  </a:ext>
+                </a:extLst>
+              </a:tr>
+              <a:tr h="370840">
+                <a:tc>
+                  <a:txBody>
+                    <a:bodyPr/>
+                    <a:lstStyle/>
+                    <a:p>
+                      <a:r>
+                        <a:rPr lang="en-US" dirty="0"/>
+                        <a:t>CSS</a:t>
+                      </a:r>
+                    </a:p>
+                  </a:txBody>
+                  <a:tcPr/>
+                </a:tc>
+                <a:tc>
+                  <a:txBody>
+                    <a:bodyPr/>
+                    <a:lstStyle/>
+                    <a:p>
+                      <a:r>
+                        <a:rPr lang="en-US" dirty="0"/>
+                        <a:t>Computer System Society</a:t>
+                      </a:r>
+                    </a:p>
+                  </a:txBody>
+                  <a:tcPr/>
+                </a:tc>
+                <a:extLst>
+                  <a:ext uri="{0D108BD9-81ED-4DB2-BD59-A6C34878D82A}">
+                    <a16:rowId xmlns:a16="http://schemas.microsoft.com/office/drawing/2014/main" val="10004"/>
+                  </a:ext>
+                </a:extLst>
+              </a:tr>
+              <a:tr h="370840">
+                <a:tc>
+                  <a:txBody>
+                    <a:bodyPr/>
+                    <a:lstStyle/>
+                    <a:p>
+                      <a:r>
+                        <a:rPr lang="en-US" strike="sngStrike" dirty="0">
+                          <a:solidFill>
+                            <a:schemeClr val="bg1">
+                              <a:lumMod val="65000"/>
+                            </a:schemeClr>
+                          </a:solidFill>
+                        </a:rPr>
+                        <a:t>DBTG</a:t>
+                      </a:r>
+                    </a:p>
+                  </a:txBody>
+                  <a:tcPr/>
+                </a:tc>
+                <a:tc>
+                  <a:txBody>
+                    <a:bodyPr/>
+                    <a:lstStyle/>
+                    <a:p>
+                      <a:r>
+                        <a:rPr lang="en-US" strike="sngStrike" dirty="0" err="1">
+                          <a:solidFill>
+                            <a:schemeClr val="bg1">
+                              <a:lumMod val="65000"/>
+                            </a:schemeClr>
+                          </a:solidFill>
+                        </a:rPr>
+                        <a:t>DataBase</a:t>
+                      </a:r>
+                      <a:r>
+                        <a:rPr lang="en-US" strike="sngStrike" dirty="0">
+                          <a:solidFill>
+                            <a:schemeClr val="bg1">
+                              <a:lumMod val="65000"/>
+                            </a:schemeClr>
+                          </a:solidFill>
+                        </a:rPr>
+                        <a:t> Task Group</a:t>
+                      </a:r>
+                    </a:p>
+                  </a:txBody>
+                  <a:tcPr/>
+                </a:tc>
+                <a:extLst>
+                  <a:ext uri="{0D108BD9-81ED-4DB2-BD59-A6C34878D82A}">
+                    <a16:rowId xmlns:a16="http://schemas.microsoft.com/office/drawing/2014/main" val="10005"/>
+                  </a:ext>
+                </a:extLst>
+              </a:tr>
+              <a:tr h="370840">
+                <a:tc>
+                  <a:txBody>
+                    <a:bodyPr/>
+                    <a:lstStyle/>
+                    <a:p>
+                      <a:r>
+                        <a:rPr lang="en-US" strike="sngStrike" dirty="0">
+                          <a:solidFill>
+                            <a:schemeClr val="bg1">
+                              <a:lumMod val="65000"/>
+                            </a:schemeClr>
+                          </a:solidFill>
+                        </a:rPr>
+                        <a:t>NAITSA</a:t>
+                      </a:r>
+                    </a:p>
+                  </a:txBody>
+                  <a:tcPr/>
+                </a:tc>
+                <a:tc>
+                  <a:txBody>
+                    <a:bodyPr/>
+                    <a:lstStyle/>
+                    <a:p>
+                      <a:r>
+                        <a:rPr lang="en-US" strike="sngStrike" dirty="0">
+                          <a:solidFill>
+                            <a:schemeClr val="bg1">
+                              <a:lumMod val="65000"/>
+                            </a:schemeClr>
+                          </a:solidFill>
+                        </a:rPr>
+                        <a:t>NAIT Student Association</a:t>
+                      </a:r>
+                    </a:p>
+                  </a:txBody>
+                  <a:tcPr/>
+                </a:tc>
+                <a:extLst>
+                  <a:ext uri="{0D108BD9-81ED-4DB2-BD59-A6C34878D82A}">
+                    <a16:rowId xmlns:a16="http://schemas.microsoft.com/office/drawing/2014/main" val="10006"/>
+                  </a:ext>
+                </a:extLst>
+              </a:tr>
+              <a:tr h="370840">
+                <a:tc>
+                  <a:txBody>
+                    <a:bodyPr/>
+                    <a:lstStyle/>
+                    <a:p>
+                      <a:r>
+                        <a:rPr lang="en-US" dirty="0"/>
+                        <a:t>NASA</a:t>
+                      </a:r>
+                    </a:p>
+                  </a:txBody>
+                  <a:tcPr/>
+                </a:tc>
+                <a:tc>
+                  <a:txBody>
+                    <a:bodyPr/>
+                    <a:lstStyle/>
+                    <a:p>
+                      <a:r>
+                        <a:rPr lang="en-US" dirty="0"/>
+                        <a:t>NAIT Staff Association</a:t>
+                      </a:r>
+                    </a:p>
+                  </a:txBody>
+                  <a:tcPr/>
+                </a:tc>
+                <a:extLst>
+                  <a:ext uri="{0D108BD9-81ED-4DB2-BD59-A6C34878D82A}">
+                    <a16:rowId xmlns:a16="http://schemas.microsoft.com/office/drawing/2014/main" val="10007"/>
+                  </a:ext>
+                </a:extLst>
+              </a:tr>
+              <a:tr h="370840">
+                <a:tc>
+                  <a:txBody>
+                    <a:bodyPr/>
+                    <a:lstStyle/>
+                    <a:p>
+                      <a:r>
+                        <a:rPr lang="en-US" strike="sngStrike" dirty="0">
+                          <a:solidFill>
+                            <a:schemeClr val="bg1">
+                              <a:lumMod val="65000"/>
+                            </a:schemeClr>
+                          </a:solidFill>
+                        </a:rPr>
+                        <a:t>NASA1</a:t>
+                      </a:r>
+                    </a:p>
+                  </a:txBody>
+                  <a:tcPr/>
+                </a:tc>
+                <a:tc>
+                  <a:txBody>
+                    <a:bodyPr/>
+                    <a:lstStyle/>
+                    <a:p>
+                      <a:r>
+                        <a:rPr lang="en-US" strike="sngStrike" dirty="0">
+                          <a:solidFill>
+                            <a:schemeClr val="bg1">
+                              <a:lumMod val="65000"/>
+                            </a:schemeClr>
+                          </a:solidFill>
+                        </a:rPr>
+                        <a:t>NAIT Support Staff Association</a:t>
+                      </a:r>
+                    </a:p>
+                  </a:txBody>
+                  <a:tcPr/>
+                </a:tc>
+                <a:extLst>
+                  <a:ext uri="{0D108BD9-81ED-4DB2-BD59-A6C34878D82A}">
+                    <a16:rowId xmlns:a16="http://schemas.microsoft.com/office/drawing/2014/main" val="10008"/>
+                  </a:ext>
+                </a:extLst>
+              </a:tr>
+            </a:tbl>
+          </a:graphicData>
+        </a:graphic>
+      </p:graphicFrame>
+      <p:graphicFrame>
+        <p:nvGraphicFramePr>
+          <p:cNvPr id="6" name="Table 5"/>
+          <p:cNvGraphicFramePr>
+            <a:graphicFrameLocks noGrp="1"/>
+          </p:cNvGraphicFramePr>
+          <p:nvPr/>
+        </p:nvGraphicFramePr>
+        <p:xfrm>
+          <a:off x="5715000" y="1510843"/>
+          <a:ext cx="2362200" cy="4079240"/>
+        </p:xfrm>
+        <a:graphic>
+          <a:graphicData uri="http://schemas.openxmlformats.org/drawingml/2006/table">
+            <a:tbl>
+              <a:tblPr firstRow="1" bandRow="1">
+                <a:tableStyleId>{5C22544A-7EE6-4342-B048-85BDC9FD1C3A}</a:tableStyleId>
+              </a:tblPr>
+              <a:tblGrid>
+                <a:gridCol w="1447800">
+                  <a:extLst>
+                    <a:ext uri="{9D8B030D-6E8A-4147-A177-3AD203B41FA5}">
+                      <a16:colId xmlns:a16="http://schemas.microsoft.com/office/drawing/2014/main" val="20000"/>
+                    </a:ext>
+                  </a:extLst>
+                </a:gridCol>
+                <a:gridCol w="914400">
+                  <a:extLst>
+                    <a:ext uri="{9D8B030D-6E8A-4147-A177-3AD203B41FA5}">
+                      <a16:colId xmlns:a16="http://schemas.microsoft.com/office/drawing/2014/main" val="20001"/>
+                    </a:ext>
+                  </a:extLst>
+                </a:gridCol>
+              </a:tblGrid>
+              <a:tr h="370840">
+                <a:tc>
+                  <a:txBody>
+                    <a:bodyPr/>
+                    <a:lstStyle/>
+                    <a:p>
+                      <a:r>
+                        <a:rPr lang="en-US" dirty="0" err="1"/>
+                        <a:t>StudentID</a:t>
+                      </a:r>
+                      <a:endParaRPr lang="en-US" dirty="0"/>
+                    </a:p>
+                  </a:txBody>
+                  <a:tcPr/>
+                </a:tc>
+                <a:tc>
+                  <a:txBody>
+                    <a:bodyPr/>
+                    <a:lstStyle/>
+                    <a:p>
+                      <a:pPr marL="0" marR="0" indent="0" algn="l" defTabSz="914400" rtl="0" eaLnBrk="1" fontAlgn="auto" latinLnBrk="0" hangingPunct="1">
+                        <a:lnSpc>
+                          <a:spcPct val="100000"/>
+                        </a:lnSpc>
+                        <a:spcBef>
+                          <a:spcPts val="0"/>
+                        </a:spcBef>
+                        <a:spcAft>
+                          <a:spcPts val="0"/>
+                        </a:spcAft>
+                        <a:buClrTx/>
+                        <a:buSzTx/>
+                        <a:buFontTx/>
+                        <a:buNone/>
+                        <a:tabLst/>
+                        <a:defRPr/>
+                      </a:pPr>
+                      <a:r>
+                        <a:rPr lang="en-US" dirty="0" err="1"/>
+                        <a:t>ClubId</a:t>
+                      </a:r>
+                      <a:endParaRPr lang="en-US" dirty="0"/>
+                    </a:p>
+                  </a:txBody>
+                  <a:tcPr/>
+                </a:tc>
+                <a:extLst>
+                  <a:ext uri="{0D108BD9-81ED-4DB2-BD59-A6C34878D82A}">
+                    <a16:rowId xmlns:a16="http://schemas.microsoft.com/office/drawing/2014/main" val="10000"/>
+                  </a:ext>
+                </a:extLst>
+              </a:tr>
+              <a:tr h="370840">
+                <a:tc>
+                  <a:txBody>
+                    <a:bodyPr/>
+                    <a:lstStyle/>
+                    <a:p>
+                      <a:r>
+                        <a:rPr lang="en-US" dirty="0"/>
+                        <a:t>199899200</a:t>
+                      </a:r>
+                    </a:p>
+                  </a:txBody>
+                  <a:tcPr/>
+                </a:tc>
+                <a:tc>
+                  <a:txBody>
+                    <a:bodyPr/>
+                    <a:lstStyle/>
+                    <a:p>
+                      <a:r>
+                        <a:rPr lang="en-US" dirty="0"/>
+                        <a:t>CSS</a:t>
+                      </a:r>
+                    </a:p>
+                  </a:txBody>
+                  <a:tcPr/>
+                </a:tc>
+                <a:extLst>
+                  <a:ext uri="{0D108BD9-81ED-4DB2-BD59-A6C34878D82A}">
+                    <a16:rowId xmlns:a16="http://schemas.microsoft.com/office/drawing/2014/main" val="10001"/>
+                  </a:ext>
+                </a:extLst>
+              </a:tr>
+              <a:tr h="370840">
+                <a:tc>
+                  <a:txBody>
+                    <a:bodyPr/>
+                    <a:lstStyle/>
+                    <a:p>
+                      <a:r>
+                        <a:rPr lang="en-US" dirty="0"/>
+                        <a:t>199912010</a:t>
+                      </a:r>
+                    </a:p>
+                  </a:txBody>
+                  <a:tcPr/>
+                </a:tc>
+                <a:tc>
+                  <a:txBody>
+                    <a:bodyPr/>
+                    <a:lstStyle/>
+                    <a:p>
+                      <a:r>
+                        <a:rPr lang="en-US" dirty="0"/>
+                        <a:t>ACM</a:t>
+                      </a:r>
+                    </a:p>
+                  </a:txBody>
+                  <a:tcPr/>
+                </a:tc>
+                <a:extLst>
+                  <a:ext uri="{0D108BD9-81ED-4DB2-BD59-A6C34878D82A}">
+                    <a16:rowId xmlns:a16="http://schemas.microsoft.com/office/drawing/2014/main" val="10002"/>
+                  </a:ext>
+                </a:extLst>
+              </a:tr>
+              <a:tr h="370840">
+                <a:tc>
+                  <a:txBody>
+                    <a:bodyPr/>
+                    <a:lstStyle/>
+                    <a:p>
+                      <a:r>
+                        <a:rPr lang="en-US" dirty="0"/>
+                        <a:t>199912010</a:t>
+                      </a:r>
+                    </a:p>
+                  </a:txBody>
+                  <a:tcPr/>
+                </a:tc>
+                <a:tc>
+                  <a:txBody>
+                    <a:bodyPr/>
+                    <a:lstStyle/>
+                    <a:p>
+                      <a:r>
+                        <a:rPr lang="en-US" dirty="0"/>
+                        <a:t>CSS</a:t>
+                      </a:r>
+                    </a:p>
+                  </a:txBody>
+                  <a:tcPr/>
+                </a:tc>
+                <a:extLst>
+                  <a:ext uri="{0D108BD9-81ED-4DB2-BD59-A6C34878D82A}">
+                    <a16:rowId xmlns:a16="http://schemas.microsoft.com/office/drawing/2014/main" val="10003"/>
+                  </a:ext>
+                </a:extLst>
+              </a:tr>
+              <a:tr h="370840">
+                <a:tc>
+                  <a:txBody>
+                    <a:bodyPr/>
+                    <a:lstStyle/>
+                    <a:p>
+                      <a:r>
+                        <a:rPr lang="en-US" dirty="0"/>
+                        <a:t>199912010</a:t>
+                      </a:r>
+                    </a:p>
+                  </a:txBody>
+                  <a:tcPr/>
+                </a:tc>
+                <a:tc>
+                  <a:txBody>
+                    <a:bodyPr/>
+                    <a:lstStyle/>
+                    <a:p>
+                      <a:r>
+                        <a:rPr lang="en-US" dirty="0"/>
+                        <a:t>NASA</a:t>
+                      </a:r>
+                    </a:p>
+                  </a:txBody>
+                  <a:tcPr/>
+                </a:tc>
+                <a:extLst>
+                  <a:ext uri="{0D108BD9-81ED-4DB2-BD59-A6C34878D82A}">
+                    <a16:rowId xmlns:a16="http://schemas.microsoft.com/office/drawing/2014/main" val="10004"/>
+                  </a:ext>
+                </a:extLst>
+              </a:tr>
+              <a:tr h="370840">
+                <a:tc>
+                  <a:txBody>
+                    <a:bodyPr/>
+                    <a:lstStyle/>
+                    <a:p>
+                      <a:r>
+                        <a:rPr lang="en-US" dirty="0"/>
+                        <a:t>200312345</a:t>
+                      </a:r>
+                    </a:p>
+                  </a:txBody>
+                  <a:tcPr/>
+                </a:tc>
+                <a:tc>
+                  <a:txBody>
+                    <a:bodyPr/>
+                    <a:lstStyle/>
+                    <a:p>
+                      <a:r>
+                        <a:rPr lang="en-US" dirty="0"/>
+                        <a:t>CSS</a:t>
+                      </a:r>
+                    </a:p>
+                  </a:txBody>
+                  <a:tcPr/>
+                </a:tc>
+                <a:extLst>
+                  <a:ext uri="{0D108BD9-81ED-4DB2-BD59-A6C34878D82A}">
+                    <a16:rowId xmlns:a16="http://schemas.microsoft.com/office/drawing/2014/main" val="10005"/>
+                  </a:ext>
+                </a:extLst>
+              </a:tr>
+              <a:tr h="370840">
+                <a:tc>
+                  <a:txBody>
+                    <a:bodyPr/>
+                    <a:lstStyle/>
+                    <a:p>
+                      <a:r>
+                        <a:rPr lang="en-US" dirty="0"/>
+                        <a:t>200322620</a:t>
+                      </a:r>
+                    </a:p>
+                  </a:txBody>
+                  <a:tcPr/>
+                </a:tc>
+                <a:tc>
+                  <a:txBody>
+                    <a:bodyPr/>
+                    <a:lstStyle/>
+                    <a:p>
+                      <a:r>
+                        <a:rPr lang="en-US" dirty="0"/>
+                        <a:t>ACM</a:t>
+                      </a:r>
+                    </a:p>
+                  </a:txBody>
+                  <a:tcPr/>
+                </a:tc>
+                <a:extLst>
+                  <a:ext uri="{0D108BD9-81ED-4DB2-BD59-A6C34878D82A}">
+                    <a16:rowId xmlns:a16="http://schemas.microsoft.com/office/drawing/2014/main" val="10006"/>
+                  </a:ext>
+                </a:extLst>
+              </a:tr>
+              <a:tr h="370840">
+                <a:tc>
+                  <a:txBody>
+                    <a:bodyPr/>
+                    <a:lstStyle/>
+                    <a:p>
+                      <a:r>
+                        <a:rPr lang="en-US" dirty="0"/>
+                        <a:t>200322620</a:t>
+                      </a:r>
+                    </a:p>
+                  </a:txBody>
+                  <a:tcPr/>
+                </a:tc>
+                <a:tc>
+                  <a:txBody>
+                    <a:bodyPr/>
+                    <a:lstStyle/>
+                    <a:p>
+                      <a:r>
+                        <a:rPr lang="en-US" dirty="0"/>
+                        <a:t>CSS</a:t>
+                      </a:r>
+                    </a:p>
+                  </a:txBody>
+                  <a:tcPr/>
+                </a:tc>
+                <a:extLst>
+                  <a:ext uri="{0D108BD9-81ED-4DB2-BD59-A6C34878D82A}">
+                    <a16:rowId xmlns:a16="http://schemas.microsoft.com/office/drawing/2014/main" val="10007"/>
+                  </a:ext>
+                </a:extLst>
+              </a:tr>
+              <a:tr h="370840">
+                <a:tc>
+                  <a:txBody>
+                    <a:bodyPr/>
+                    <a:lstStyle/>
+                    <a:p>
+                      <a:r>
+                        <a:rPr lang="en-US" dirty="0"/>
+                        <a:t>200495500</a:t>
+                      </a:r>
+                    </a:p>
+                  </a:txBody>
+                  <a:tcPr/>
+                </a:tc>
+                <a:tc>
+                  <a:txBody>
+                    <a:bodyPr/>
+                    <a:lstStyle/>
+                    <a:p>
+                      <a:r>
+                        <a:rPr lang="en-US" dirty="0"/>
+                        <a:t>ACM</a:t>
+                      </a:r>
+                    </a:p>
+                  </a:txBody>
+                  <a:tcPr/>
+                </a:tc>
+                <a:extLst>
+                  <a:ext uri="{0D108BD9-81ED-4DB2-BD59-A6C34878D82A}">
+                    <a16:rowId xmlns:a16="http://schemas.microsoft.com/office/drawing/2014/main" val="10008"/>
+                  </a:ext>
+                </a:extLst>
+              </a:tr>
+              <a:tr h="370840">
+                <a:tc>
+                  <a:txBody>
+                    <a:bodyPr/>
+                    <a:lstStyle/>
+                    <a:p>
+                      <a:r>
+                        <a:rPr lang="en-US" dirty="0"/>
+                        <a:t>200495500</a:t>
+                      </a:r>
+                    </a:p>
+                  </a:txBody>
+                  <a:tcPr/>
+                </a:tc>
+                <a:tc>
+                  <a:txBody>
+                    <a:bodyPr/>
+                    <a:lstStyle/>
+                    <a:p>
+                      <a:r>
+                        <a:rPr lang="en-US" dirty="0"/>
+                        <a:t>CHESS</a:t>
+                      </a:r>
+                    </a:p>
+                  </a:txBody>
+                  <a:tcPr/>
+                </a:tc>
+                <a:extLst>
+                  <a:ext uri="{0D108BD9-81ED-4DB2-BD59-A6C34878D82A}">
+                    <a16:rowId xmlns:a16="http://schemas.microsoft.com/office/drawing/2014/main" val="10009"/>
+                  </a:ext>
+                </a:extLst>
+              </a:tr>
+              <a:tr h="370840">
+                <a:tc>
+                  <a:txBody>
+                    <a:bodyPr/>
+                    <a:lstStyle/>
+                    <a:p>
+                      <a:r>
+                        <a:rPr lang="en-US" dirty="0"/>
+                        <a:t>200495500</a:t>
+                      </a:r>
+                    </a:p>
+                  </a:txBody>
+                  <a:tcPr/>
+                </a:tc>
+                <a:tc>
+                  <a:txBody>
+                    <a:bodyPr/>
+                    <a:lstStyle/>
+                    <a:p>
+                      <a:r>
+                        <a:rPr lang="en-US" dirty="0"/>
+                        <a:t>CSS</a:t>
+                      </a:r>
+                    </a:p>
+                  </a:txBody>
+                  <a:tcPr/>
+                </a:tc>
+                <a:extLst>
+                  <a:ext uri="{0D108BD9-81ED-4DB2-BD59-A6C34878D82A}">
+                    <a16:rowId xmlns:a16="http://schemas.microsoft.com/office/drawing/2014/main" val="10010"/>
+                  </a:ext>
+                </a:extLst>
+              </a:tr>
+            </a:tbl>
+          </a:graphicData>
+        </a:graphic>
+      </p:graphicFrame>
+      <p:sp>
+        <p:nvSpPr>
+          <p:cNvPr id="7" name="TextBox 6"/>
+          <p:cNvSpPr txBox="1"/>
+          <p:nvPr/>
+        </p:nvSpPr>
+        <p:spPr>
+          <a:xfrm>
+            <a:off x="609600" y="5029200"/>
+            <a:ext cx="4876800" cy="1477328"/>
+          </a:xfrm>
+          <a:prstGeom prst="rect">
+            <a:avLst/>
+          </a:prstGeom>
+          <a:noFill/>
+        </p:spPr>
+        <p:txBody>
+          <a:bodyPr wrap="square" rtlCol="0">
+            <a:spAutoFit/>
+          </a:bodyPr>
+          <a:lstStyle/>
+          <a:p>
+            <a:r>
+              <a:rPr lang="en-US" dirty="0"/>
+              <a:t>Consider the </a:t>
+            </a:r>
+            <a:r>
+              <a:rPr lang="en-US" b="1" u="sng" dirty="0"/>
+              <a:t>INNER</a:t>
+            </a:r>
+            <a:r>
+              <a:rPr lang="en-US" b="1" dirty="0"/>
+              <a:t> JOIN </a:t>
+            </a:r>
+            <a:r>
+              <a:rPr lang="en-US" dirty="0"/>
+              <a:t>that we looked at earlier.</a:t>
+            </a:r>
+          </a:p>
+          <a:p>
+            <a:r>
+              <a:rPr lang="en-US" b="1" i="1" dirty="0"/>
+              <a:t>INNER</a:t>
+            </a:r>
+            <a:r>
+              <a:rPr lang="en-US" dirty="0"/>
+              <a:t> means that there must be rows of data in both tables.</a:t>
+            </a:r>
+          </a:p>
+          <a:p>
+            <a:r>
+              <a:rPr lang="en-US" dirty="0"/>
+              <a:t>There are four clubs that will NOT be included in our final result.</a:t>
+            </a:r>
+          </a:p>
+        </p:txBody>
+      </p:sp>
+      <p:sp>
+        <p:nvSpPr>
+          <p:cNvPr id="5" name="TextBox 4">
+            <a:extLst>
+              <a:ext uri="{FF2B5EF4-FFF2-40B4-BE49-F238E27FC236}">
+                <a16:creationId xmlns:a16="http://schemas.microsoft.com/office/drawing/2014/main" id="{3F7E986E-DB6C-17D8-3904-4478E9D973D0}"/>
+              </a:ext>
+            </a:extLst>
+          </p:cNvPr>
+          <p:cNvSpPr txBox="1"/>
+          <p:nvPr/>
+        </p:nvSpPr>
+        <p:spPr>
+          <a:xfrm>
+            <a:off x="5486400" y="5791200"/>
+            <a:ext cx="2590800" cy="646331"/>
+          </a:xfrm>
+          <a:prstGeom prst="rect">
+            <a:avLst/>
+          </a:prstGeom>
+          <a:noFill/>
+        </p:spPr>
+        <p:txBody>
+          <a:bodyPr wrap="square" rtlCol="0">
+            <a:spAutoFit/>
+          </a:bodyPr>
+          <a:lstStyle/>
+          <a:p>
+            <a:r>
+              <a:rPr lang="en-US" sz="3600" b="1" dirty="0">
+                <a:solidFill>
+                  <a:schemeClr val="accent6"/>
+                </a:solidFill>
+              </a:rPr>
+              <a:t>INNER JOIN</a:t>
+            </a:r>
+          </a:p>
+        </p:txBody>
+      </p:sp>
+    </p:spTree>
+    <p:extLst>
+      <p:ext uri="{BB962C8B-B14F-4D97-AF65-F5344CB8AC3E}">
+        <p14:creationId xmlns:p14="http://schemas.microsoft.com/office/powerpoint/2010/main" val="506662101"/>
+      </p:ext>
+    </p:extLst>
+  </p:cSld>
+  <p:clrMapOvr>
+    <a:masterClrMapping/>
+  </p:clrMapOvr>
+</p:sld>
+</file>
+
+<file path=ppt/slides/slide14.xml><?xml version="1.0" encoding="utf-8"?>
+<p:sld xmlns:a="http://schemas.openxmlformats.org/drawingml/2006/main" xmlns:r="http://schemas.openxmlformats.org/officeDocument/2006/relationships" xmlns:p="http://schemas.openxmlformats.org/presentationml/2006/main">
+  <p:cSld>
+    <p:spTree>
+      <p:nvGrpSpPr>
+        <p:cNvPr id="1" name=""/>
+        <p:cNvGrpSpPr/>
+        <p:nvPr/>
+      </p:nvGrpSpPr>
+      <p:grpSpPr>
+        <a:xfrm>
+          <a:off x="0" y="0"/>
+          <a:ext cx="0" cy="0"/>
+          <a:chOff x="0" y="0"/>
+          <a:chExt cx="0" cy="0"/>
+        </a:xfrm>
+      </p:grpSpPr>
+      <p:sp>
+        <p:nvSpPr>
+          <p:cNvPr id="2" name="TextBox 1"/>
+          <p:cNvSpPr txBox="1"/>
+          <p:nvPr/>
+        </p:nvSpPr>
+        <p:spPr>
+          <a:xfrm>
+            <a:off x="609600" y="228600"/>
+            <a:ext cx="7848600" cy="369332"/>
+          </a:xfrm>
+          <a:prstGeom prst="rect">
+            <a:avLst/>
+          </a:prstGeom>
+          <a:noFill/>
+        </p:spPr>
+        <p:txBody>
+          <a:bodyPr wrap="square" rtlCol="0">
+            <a:spAutoFit/>
+          </a:bodyPr>
+          <a:lstStyle/>
+          <a:p>
+            <a:r>
+              <a:rPr lang="en-US" dirty="0"/>
               <a:t>Select all the club names and the IDs of the students that are registered in them.</a:t>
             </a:r>
           </a:p>
@@ -10530,6 +11693,45 @@
             <a:r>
               <a:rPr lang="en-US" dirty="0"/>
               <a:t>Club is the “left” table</a:t>
+            </a:r>
+          </a:p>
+        </p:txBody>
+      </p:sp>
+      <p:sp>
+        <p:nvSpPr>
+          <p:cNvPr id="8" name="TextBox 7">
+            <a:extLst>
+              <a:ext uri="{FF2B5EF4-FFF2-40B4-BE49-F238E27FC236}">
+                <a16:creationId xmlns:a16="http://schemas.microsoft.com/office/drawing/2014/main" id="{FFE1119F-E6C9-97CC-D85F-0CF18196C968}"/>
+              </a:ext>
+            </a:extLst>
+          </p:cNvPr>
+          <p:cNvSpPr txBox="1"/>
+          <p:nvPr/>
+        </p:nvSpPr>
+        <p:spPr>
+          <a:xfrm>
+            <a:off x="5486400" y="5791200"/>
+            <a:ext cx="2590800" cy="646331"/>
+          </a:xfrm>
+          <a:prstGeom prst="rect">
+            <a:avLst/>
+          </a:prstGeom>
+          <a:noFill/>
+        </p:spPr>
+        <p:txBody>
+          <a:bodyPr wrap="square" rtlCol="0">
+            <a:spAutoFit/>
+          </a:bodyPr>
+          <a:lstStyle/>
+          <a:p>
+            <a:r>
+              <a:rPr lang="en-US" sz="3600" b="1" i="1" u="sng" dirty="0">
+                <a:solidFill>
+                  <a:srgbClr val="7030A0"/>
+                </a:solidFill>
+              </a:rPr>
+              <a:t>OUTER JOIN</a:t>
             </a:r>
           </a:p>
         </p:txBody>
@@ -10671,7 +11873,7 @@
 </p:sld>
 </file>
 
-<file path=ppt/slides/slide14.xml><?xml version="1.0" encoding="utf-8"?>
+<file path=ppt/slides/slide15.xml><?xml version="1.0" encoding="utf-8"?>
 <p:sld xmlns:a="http://schemas.openxmlformats.org/drawingml/2006/main" xmlns:r="http://schemas.openxmlformats.org/officeDocument/2006/relationships" xmlns:p="http://schemas.openxmlformats.org/presentationml/2006/main">
   <p:cSld>
     <p:spTree>
@@ -12059,7 +13261,7 @@
 </p:sld>
 </file>
 
-<file path=ppt/slides/slide15.xml><?xml version="1.0" encoding="utf-8"?>
+<file path=ppt/slides/slide16.xml><?xml version="1.0" encoding="utf-8"?>
 <p:sld xmlns:a="http://schemas.openxmlformats.org/drawingml/2006/main" xmlns:r="http://schemas.openxmlformats.org/officeDocument/2006/relationships" xmlns:p="http://schemas.openxmlformats.org/presentationml/2006/main">
   <p:cSld>
     <p:bg>
@@ -12100,7 +13302,81 @@
 </p:sld>
 </file>
 
-<file path=ppt/slides/slide16.xml><?xml version="1.0" encoding="utf-8"?>
+<file path=ppt/slides/slide17.xml><?xml version="1.0" encoding="utf-8"?>
+<p:sld xmlns:a="http://schemas.openxmlformats.org/drawingml/2006/main" xmlns:r="http://schemas.openxmlformats.org/officeDocument/2006/relationships" xmlns:p="http://schemas.openxmlformats.org/presentationml/2006/main">
+  <p:cSld>
+    <p:spTree>
+      <p:nvGrpSpPr>
+        <p:cNvPr id="1" name=""/>
+        <p:cNvGrpSpPr/>
+        <p:nvPr/>
+      </p:nvGrpSpPr>
+      <p:grpSpPr>
+        <a:xfrm>
+          <a:off x="0" y="0"/>
+          <a:ext cx="0" cy="0"/>
+          <a:chOff x="0" y="0"/>
+          <a:chExt cx="0" cy="0"/>
+        </a:xfrm>
+      </p:grpSpPr>
+      <p:sp>
+        <p:nvSpPr>
+          <p:cNvPr id="2" name="Title 1"/>
+          <p:cNvSpPr>
+            <a:spLocks noGrp="1"/>
+          </p:cNvSpPr>
+          <p:nvPr>
+            <p:ph type="title"/>
+          </p:nvPr>
+        </p:nvSpPr>
+        <p:spPr/>
+        <p:txBody>
+          <a:bodyPr/>
+          <a:lstStyle/>
+          <a:p>
+            <a:r>
+              <a:rPr lang="en-US" dirty="0"/>
+              <a:t>Using Your ERD Effectively</a:t>
+            </a:r>
+          </a:p>
+        </p:txBody>
+      </p:sp>
+      <p:sp>
+        <p:nvSpPr>
+          <p:cNvPr id="3" name="Text Placeholder 2"/>
+          <p:cNvSpPr>
+            <a:spLocks noGrp="1"/>
+          </p:cNvSpPr>
+          <p:nvPr>
+            <p:ph type="body" idx="1"/>
+          </p:nvPr>
+        </p:nvSpPr>
+        <p:spPr/>
+        <p:txBody>
+          <a:bodyPr/>
+          <a:lstStyle/>
+          <a:p>
+            <a:r>
+              <a:rPr lang="en-US" dirty="0"/>
+              <a:t>Thinking through SQL Problem Statements</a:t>
+            </a:r>
+          </a:p>
+        </p:txBody>
+      </p:sp>
+    </p:spTree>
+    <p:extLst>
+      <p:ext uri="{BB962C8B-B14F-4D97-AF65-F5344CB8AC3E}">
+        <p14:creationId xmlns:p14="http://schemas.microsoft.com/office/powerpoint/2010/main" val="2273161563"/>
+      </p:ext>
+    </p:extLst>
+  </p:cSld>
+  <p:clrMapOvr>
+    <a:masterClrMapping/>
+  </p:clrMapOvr>
+</p:sld>
+</file>
+
+<file path=ppt/slides/slide18.xml><?xml version="1.0" encoding="utf-8"?>
 <p:sld xmlns:a="http://schemas.openxmlformats.org/drawingml/2006/main" xmlns:r="http://schemas.openxmlformats.org/officeDocument/2006/relationships" xmlns:p="http://schemas.openxmlformats.org/presentationml/2006/main" show="0">
   <p:cSld>
     <p:spTree>
@@ -12823,7 +14099,7 @@
 </p:sld>
 </file>
 
-<file path=ppt/slides/slide17.xml><?xml version="1.0" encoding="utf-8"?>
+<file path=ppt/slides/slide19.xml><?xml version="1.0" encoding="utf-8"?>
 <p:sld xmlns:a="http://schemas.openxmlformats.org/drawingml/2006/main" xmlns:r="http://schemas.openxmlformats.org/officeDocument/2006/relationships" xmlns:p="http://schemas.openxmlformats.org/presentationml/2006/main">
   <p:cSld>
     <p:spTree>
@@ -14422,7 +15698,81 @@
 </p:sld>
 </file>
 
-<file path=ppt/slides/slide18.xml><?xml version="1.0" encoding="utf-8"?>
+<file path=ppt/slides/slide2.xml><?xml version="1.0" encoding="utf-8"?>
+<p:sld xmlns:a="http://schemas.openxmlformats.org/drawingml/2006/main" xmlns:r="http://schemas.openxmlformats.org/officeDocument/2006/relationships" xmlns:p="http://schemas.openxmlformats.org/presentationml/2006/main">
+  <p:cSld>
+    <p:spTree>
+      <p:nvGrpSpPr>
+        <p:cNvPr id="1" name=""/>
+        <p:cNvGrpSpPr/>
+        <p:nvPr/>
+      </p:nvGrpSpPr>
+      <p:grpSpPr>
+        <a:xfrm>
+          <a:off x="0" y="0"/>
+          <a:ext cx="0" cy="0"/>
+          <a:chOff x="0" y="0"/>
+          <a:chExt cx="0" cy="0"/>
+        </a:xfrm>
+      </p:grpSpPr>
+      <p:sp>
+        <p:nvSpPr>
+          <p:cNvPr id="2" name="Title 1"/>
+          <p:cNvSpPr>
+            <a:spLocks noGrp="1"/>
+          </p:cNvSpPr>
+          <p:nvPr>
+            <p:ph type="title"/>
+          </p:nvPr>
+        </p:nvSpPr>
+        <p:spPr/>
+        <p:txBody>
+          <a:bodyPr/>
+          <a:lstStyle/>
+          <a:p>
+            <a:r>
+              <a:rPr lang="en-US" dirty="0"/>
+              <a:t>INNER JOIN</a:t>
+            </a:r>
+          </a:p>
+        </p:txBody>
+      </p:sp>
+      <p:sp>
+        <p:nvSpPr>
+          <p:cNvPr id="3" name="Text Placeholder 2"/>
+          <p:cNvSpPr>
+            <a:spLocks noGrp="1"/>
+          </p:cNvSpPr>
+          <p:nvPr>
+            <p:ph type="body" idx="1"/>
+          </p:nvPr>
+        </p:nvSpPr>
+        <p:spPr/>
+        <p:txBody>
+          <a:bodyPr/>
+          <a:lstStyle/>
+          <a:p>
+            <a:r>
+              <a:rPr lang="en-US" dirty="0"/>
+              <a:t>Visualizing Inner Joins</a:t>
+            </a:r>
+          </a:p>
+        </p:txBody>
+      </p:sp>
+    </p:spTree>
+    <p:extLst>
+      <p:ext uri="{BB962C8B-B14F-4D97-AF65-F5344CB8AC3E}">
+        <p14:creationId xmlns:p14="http://schemas.microsoft.com/office/powerpoint/2010/main" val="2741172208"/>
+      </p:ext>
+    </p:extLst>
+  </p:cSld>
+  <p:clrMapOvr>
+    <a:masterClrMapping/>
+  </p:clrMapOvr>
+</p:sld>
+</file>
+
+<file path=ppt/slides/slide20.xml><?xml version="1.0" encoding="utf-8"?>
 <p:sld xmlns:a="http://schemas.openxmlformats.org/drawingml/2006/main" xmlns:r="http://schemas.openxmlformats.org/officeDocument/2006/relationships" xmlns:p="http://schemas.openxmlformats.org/presentationml/2006/main">
   <p:cSld>
     <p:spTree>
@@ -16311,7 +17661,7 @@
 </p:sld>
 </file>
 
-<file path=ppt/slides/slide19.xml><?xml version="1.0" encoding="utf-8"?>
+<file path=ppt/slides/slide21.xml><?xml version="1.0" encoding="utf-8"?>
 <p:sld xmlns:a="http://schemas.openxmlformats.org/drawingml/2006/main" xmlns:r="http://schemas.openxmlformats.org/officeDocument/2006/relationships" xmlns:p="http://schemas.openxmlformats.org/presentationml/2006/main">
   <p:cSld>
     <p:spTree>
@@ -18023,81 +19373,7 @@
 </p:sld>
 </file>
 
-<file path=ppt/slides/slide2.xml><?xml version="1.0" encoding="utf-8"?>
-<p:sld xmlns:a="http://schemas.openxmlformats.org/drawingml/2006/main" xmlns:r="http://schemas.openxmlformats.org/officeDocument/2006/relationships" xmlns:p="http://schemas.openxmlformats.org/presentationml/2006/main">
-  <p:cSld>
-    <p:spTree>
-      <p:nvGrpSpPr>
-        <p:cNvPr id="1" name=""/>
-        <p:cNvGrpSpPr/>
-        <p:nvPr/>
-      </p:nvGrpSpPr>
-      <p:grpSpPr>
-        <a:xfrm>
-          <a:off x="0" y="0"/>
-          <a:ext cx="0" cy="0"/>
-          <a:chOff x="0" y="0"/>
-          <a:chExt cx="0" cy="0"/>
-        </a:xfrm>
-      </p:grpSpPr>
-      <p:sp>
-        <p:nvSpPr>
-          <p:cNvPr id="2" name="Title 1"/>
-          <p:cNvSpPr>
-            <a:spLocks noGrp="1"/>
-          </p:cNvSpPr>
-          <p:nvPr>
-            <p:ph type="title"/>
-          </p:nvPr>
-        </p:nvSpPr>
-        <p:spPr/>
-        <p:txBody>
-          <a:bodyPr/>
-          <a:lstStyle/>
-          <a:p>
-            <a:r>
-              <a:rPr lang="en-US" dirty="0"/>
-              <a:t>INNER JOIN</a:t>
-            </a:r>
-          </a:p>
-        </p:txBody>
-      </p:sp>
-      <p:sp>
-        <p:nvSpPr>
-          <p:cNvPr id="3" name="Text Placeholder 2"/>
-          <p:cNvSpPr>
-            <a:spLocks noGrp="1"/>
-          </p:cNvSpPr>
-          <p:nvPr>
-            <p:ph type="body" idx="1"/>
-          </p:nvPr>
-        </p:nvSpPr>
-        <p:spPr/>
-        <p:txBody>
-          <a:bodyPr/>
-          <a:lstStyle/>
-          <a:p>
-            <a:r>
-              <a:rPr lang="en-US" dirty="0"/>
-              <a:t>Visualizing Inner Joins</a:t>
-            </a:r>
-          </a:p>
-        </p:txBody>
-      </p:sp>
-    </p:spTree>
-    <p:extLst>
-      <p:ext uri="{BB962C8B-B14F-4D97-AF65-F5344CB8AC3E}">
-        <p14:creationId xmlns:p14="http://schemas.microsoft.com/office/powerpoint/2010/main" val="2741172208"/>
-      </p:ext>
-    </p:extLst>
-  </p:cSld>
-  <p:clrMapOvr>
-    <a:masterClrMapping/>
-  </p:clrMapOvr>
-</p:sld>
-</file>
-
-<file path=ppt/slides/slide20.xml><?xml version="1.0" encoding="utf-8"?>
+<file path=ppt/slides/slide22.xml><?xml version="1.0" encoding="utf-8"?>
 <p:sld xmlns:a="http://schemas.openxmlformats.org/drawingml/2006/main" xmlns:r="http://schemas.openxmlformats.org/officeDocument/2006/relationships" xmlns:p="http://schemas.openxmlformats.org/presentationml/2006/main">
   <p:cSld>
     <p:spTree>
@@ -19089,7 +20365,7 @@
 </p:sld>
 </file>
 
-<file path=ppt/slides/slide21.xml><?xml version="1.0" encoding="utf-8"?>
+<file path=ppt/slides/slide23.xml><?xml version="1.0" encoding="utf-8"?>
 <p:sld xmlns:a="http://schemas.openxmlformats.org/drawingml/2006/main" xmlns:r="http://schemas.openxmlformats.org/officeDocument/2006/relationships" xmlns:p="http://schemas.openxmlformats.org/presentationml/2006/main">
   <p:cSld>
     <p:bg>
@@ -19130,8 +20406,8 @@
 </p:sld>
 </file>
 
-<file path=ppt/slides/slide22.xml><?xml version="1.0" encoding="utf-8"?>
-<p:sld xmlns:a="http://schemas.openxmlformats.org/drawingml/2006/main" xmlns:r="http://schemas.openxmlformats.org/officeDocument/2006/relationships" xmlns:p="http://schemas.openxmlformats.org/presentationml/2006/main">
+<file path=ppt/slides/slide24.xml><?xml version="1.0" encoding="utf-8"?>
+<p:sld xmlns:a="http://schemas.openxmlformats.org/drawingml/2006/main" xmlns:r="http://schemas.openxmlformats.org/officeDocument/2006/relationships" xmlns:p="http://schemas.openxmlformats.org/presentationml/2006/main" show="0">
   <p:cSld>
     <p:spTree>
       <p:nvGrpSpPr>
@@ -19189,7 +20465,10 @@
           <a:bodyPr/>
           <a:lstStyle/>
           <a:p>
-            <a:endParaRPr lang="en-US"/>
+            <a:r>
+              <a:rPr lang="en-US" dirty="0"/>
+              <a:t>NOT COMPLETED</a:t>
+            </a:r>
           </a:p>
         </p:txBody>
       </p:sp>
@@ -19206,8 +20485,8 @@
 </p:sld>
 </file>
 
-<file path=ppt/slides/slide23.xml><?xml version="1.0" encoding="utf-8"?>
-<p:sld xmlns:a="http://schemas.openxmlformats.org/drawingml/2006/main" xmlns:r="http://schemas.openxmlformats.org/officeDocument/2006/relationships" xmlns:p="http://schemas.openxmlformats.org/presentationml/2006/main">
+<file path=ppt/slides/slide25.xml><?xml version="1.0" encoding="utf-8"?>
+<p:sld xmlns:a="http://schemas.openxmlformats.org/drawingml/2006/main" xmlns:r="http://schemas.openxmlformats.org/officeDocument/2006/relationships" xmlns:p="http://schemas.openxmlformats.org/presentationml/2006/main" show="0">
   <p:cSld>
     <p:spTree>
       <p:nvGrpSpPr>
@@ -19587,8 +20866,8 @@
 </p:sld>
 </file>
 
-<file path=ppt/slides/slide24.xml><?xml version="1.0" encoding="utf-8"?>
-<p:sld xmlns:a="http://schemas.openxmlformats.org/drawingml/2006/main" xmlns:r="http://schemas.openxmlformats.org/officeDocument/2006/relationships" xmlns:p="http://schemas.openxmlformats.org/presentationml/2006/main">
+<file path=ppt/slides/slide26.xml><?xml version="1.0" encoding="utf-8"?>
+<p:sld xmlns:a="http://schemas.openxmlformats.org/drawingml/2006/main" xmlns:r="http://schemas.openxmlformats.org/officeDocument/2006/relationships" xmlns:p="http://schemas.openxmlformats.org/presentationml/2006/main" show="0">
   <p:cSld>
     <p:spTree>
       <p:nvGrpSpPr>
@@ -19774,8 +21053,8 @@
 </p:sld>
 </file>
 
-<file path=ppt/slides/slide25.xml><?xml version="1.0" encoding="utf-8"?>
-<p:sld xmlns:a="http://schemas.openxmlformats.org/drawingml/2006/main" xmlns:r="http://schemas.openxmlformats.org/officeDocument/2006/relationships" xmlns:p="http://schemas.openxmlformats.org/presentationml/2006/main">
+<file path=ppt/slides/slide27.xml><?xml version="1.0" encoding="utf-8"?>
+<p:sld xmlns:a="http://schemas.openxmlformats.org/drawingml/2006/main" xmlns:r="http://schemas.openxmlformats.org/officeDocument/2006/relationships" xmlns:p="http://schemas.openxmlformats.org/presentationml/2006/main" show="0">
   <p:cSld>
     <p:spTree>
       <p:nvGrpSpPr>
@@ -19961,8 +21240,8 @@
 </p:sld>
 </file>
 
-<file path=ppt/slides/slide26.xml><?xml version="1.0" encoding="utf-8"?>
-<p:sld xmlns:a="http://schemas.openxmlformats.org/drawingml/2006/main" xmlns:r="http://schemas.openxmlformats.org/officeDocument/2006/relationships" xmlns:p="http://schemas.openxmlformats.org/presentationml/2006/main">
+<file path=ppt/slides/slide28.xml><?xml version="1.0" encoding="utf-8"?>
+<p:sld xmlns:a="http://schemas.openxmlformats.org/drawingml/2006/main" xmlns:r="http://schemas.openxmlformats.org/officeDocument/2006/relationships" xmlns:p="http://schemas.openxmlformats.org/presentationml/2006/main" show="0">
   <p:cSld>
     <p:spTree>
       <p:nvGrpSpPr>
@@ -20183,8 +21462,8 @@
 </p:sld>
 </file>
 
-<file path=ppt/slides/slide27.xml><?xml version="1.0" encoding="utf-8"?>
-<p:sld xmlns:a="http://schemas.openxmlformats.org/drawingml/2006/main" xmlns:r="http://schemas.openxmlformats.org/officeDocument/2006/relationships" xmlns:p="http://schemas.openxmlformats.org/presentationml/2006/main">
+<file path=ppt/slides/slide29.xml><?xml version="1.0" encoding="utf-8"?>
+<p:sld xmlns:a="http://schemas.openxmlformats.org/drawingml/2006/main" xmlns:r="http://schemas.openxmlformats.org/officeDocument/2006/relationships" xmlns:p="http://schemas.openxmlformats.org/presentationml/2006/main" show="0">
   <p:cSld>
     <p:spTree>
       <p:nvGrpSpPr>
@@ -20341,36 +21620,6 @@
 </p:sld>
 </file>
 
-<file path=ppt/slides/slide28.xml><?xml version="1.0" encoding="utf-8"?>
-<p:sld xmlns:a="http://schemas.openxmlformats.org/drawingml/2006/main" xmlns:r="http://schemas.openxmlformats.org/officeDocument/2006/relationships" xmlns:p="http://schemas.openxmlformats.org/presentationml/2006/main">
-  <p:cSld>
-    <p:spTree>
-      <p:nvGrpSpPr>
-        <p:cNvPr id="1" name=""/>
-        <p:cNvGrpSpPr/>
-        <p:nvPr/>
-      </p:nvGrpSpPr>
-      <p:grpSpPr>
-        <a:xfrm>
-          <a:off x="0" y="0"/>
-          <a:ext cx="0" cy="0"/>
-          <a:chOff x="0" y="0"/>
-          <a:chExt cx="0" cy="0"/>
-        </a:xfrm>
-      </p:grpSpPr>
-    </p:spTree>
-    <p:extLst>
-      <p:ext uri="{BB962C8B-B14F-4D97-AF65-F5344CB8AC3E}">
-        <p14:creationId xmlns:p14="http://schemas.microsoft.com/office/powerpoint/2010/main" val="3014998337"/>
-      </p:ext>
-    </p:extLst>
-  </p:cSld>
-  <p:clrMapOvr>
-    <a:masterClrMapping/>
-  </p:clrMapOvr>
-</p:sld>
-</file>
-
 <file path=ppt/slides/slide3.xml><?xml version="1.0" encoding="utf-8"?>
 <p:sld xmlns:a="http://schemas.openxmlformats.org/drawingml/2006/main" xmlns:r="http://schemas.openxmlformats.org/officeDocument/2006/relationships" xmlns:p="http://schemas.openxmlformats.org/presentationml/2006/main">
   <p:cSld>
@@ -20465,6 +21714,36 @@
     <p:extLst>
       <p:ext uri="{BB962C8B-B14F-4D97-AF65-F5344CB8AC3E}">
         <p14:creationId xmlns:p14="http://schemas.microsoft.com/office/powerpoint/2010/main" val="3049659610"/>
+      </p:ext>
+    </p:extLst>
+  </p:cSld>
+  <p:clrMapOvr>
+    <a:masterClrMapping/>
+  </p:clrMapOvr>
+</p:sld>
+</file>
+
+<file path=ppt/slides/slide30.xml><?xml version="1.0" encoding="utf-8"?>
+<p:sld xmlns:a="http://schemas.openxmlformats.org/drawingml/2006/main" xmlns:r="http://schemas.openxmlformats.org/officeDocument/2006/relationships" xmlns:p="http://schemas.openxmlformats.org/presentationml/2006/main" show="0">
+  <p:cSld>
+    <p:spTree>
+      <p:nvGrpSpPr>
+        <p:cNvPr id="1" name=""/>
+        <p:cNvGrpSpPr/>
+        <p:nvPr/>
+      </p:nvGrpSpPr>
+      <p:grpSpPr>
+        <a:xfrm>
+          <a:off x="0" y="0"/>
+          <a:ext cx="0" cy="0"/>
+          <a:chOff x="0" y="0"/>
+          <a:chExt cx="0" cy="0"/>
+        </a:xfrm>
+      </p:grpSpPr>
+    </p:spTree>
+    <p:extLst>
+      <p:ext uri="{BB962C8B-B14F-4D97-AF65-F5344CB8AC3E}">
+        <p14:creationId xmlns:p14="http://schemas.microsoft.com/office/powerpoint/2010/main" val="3014998337"/>
       </p:ext>
     </p:extLst>
   </p:cSld>

</xml_diff>